<commit_message>
package json weer normaal gezet en toevoeging opdracht 5
</commit_message>
<xml_diff>
--- a/Jenkins-SIG--08-07-2021.pptx
+++ b/Jenkins-SIG--08-07-2021.pptx
@@ -9223,6 +9223,73 @@
               <a:t> stage. </a:t>
             </a:r>
           </a:p>
+          <a:p>
+            <a:pPr lvl="1">
+              <a:spcAft>
+                <a:spcPts val="600"/>
+              </a:spcAft>
+            </a:pPr>
+            <a:endParaRPr lang="en-GB" dirty="0"/>
+          </a:p>
+          <a:p>
+            <a:pPr lvl="1">
+              <a:spcAft>
+                <a:spcPts val="600"/>
+              </a:spcAft>
+            </a:pPr>
+            <a:r>
+              <a:rPr lang="en-GB" dirty="0"/>
+              <a:t>Triggers: </a:t>
+            </a:r>
+            <a:r>
+              <a:rPr lang="en-GB" dirty="0" err="1"/>
+              <a:t>automatische</a:t>
+            </a:r>
+            <a:r>
+              <a:rPr lang="en-GB" dirty="0"/>
+              <a:t> </a:t>
+            </a:r>
+            <a:r>
+              <a:rPr lang="en-GB" dirty="0" err="1"/>
+              <a:t>manieren</a:t>
+            </a:r>
+            <a:r>
+              <a:rPr lang="en-GB" dirty="0"/>
+              <a:t> </a:t>
+            </a:r>
+            <a:r>
+              <a:rPr lang="en-GB" dirty="0" err="1"/>
+              <a:t>waarop</a:t>
+            </a:r>
+            <a:r>
+              <a:rPr lang="en-GB" dirty="0"/>
+              <a:t> pipeline </a:t>
+            </a:r>
+            <a:r>
+              <a:rPr lang="en-GB" dirty="0" err="1"/>
+              <a:t>getriggerd</a:t>
+            </a:r>
+            <a:r>
+              <a:rPr lang="en-GB" dirty="0"/>
+              <a:t> </a:t>
+            </a:r>
+            <a:r>
+              <a:rPr lang="en-GB" dirty="0" err="1"/>
+              <a:t>kunnen</a:t>
+            </a:r>
+            <a:r>
+              <a:rPr lang="en-GB" dirty="0"/>
+              <a:t> </a:t>
+            </a:r>
+            <a:r>
+              <a:rPr lang="en-GB" dirty="0" err="1"/>
+              <a:t>worden</a:t>
+            </a:r>
+            <a:r>
+              <a:rPr lang="en-GB" dirty="0"/>
+              <a:t>.  </a:t>
+            </a:r>
+          </a:p>
         </p:txBody>
       </p:sp>
       <p:pic>
@@ -9247,7 +9314,7 @@
         </p:blipFill>
         <p:spPr>
           <a:xfrm>
-            <a:off x="6630400" y="792000"/>
+            <a:off x="6630400" y="75176"/>
             <a:ext cx="2222729" cy="1741137"/>
           </a:xfrm>
           <a:prstGeom prst="rect">
@@ -9277,8 +9344,8 @@
         </p:blipFill>
         <p:spPr>
           <a:xfrm>
-            <a:off x="5383251" y="2840627"/>
-            <a:ext cx="3507988" cy="2014873"/>
+            <a:off x="5872977" y="1899353"/>
+            <a:ext cx="3237199" cy="1859341"/>
           </a:xfrm>
           <a:prstGeom prst="rect">
             <a:avLst/>
@@ -9319,6 +9386,36 @@
           </a:p>
         </p:txBody>
       </p:sp>
+      <p:pic>
+        <p:nvPicPr>
+          <p:cNvPr id="3" name="Picture 2">
+            <a:extLst>
+              <a:ext uri="{FF2B5EF4-FFF2-40B4-BE49-F238E27FC236}">
+                <a16:creationId xmlns:a16="http://schemas.microsoft.com/office/drawing/2014/main" id="{967C92F1-D84A-457F-A5AC-E108A8AC3E41}"/>
+              </a:ext>
+            </a:extLst>
+          </p:cNvPr>
+          <p:cNvPicPr>
+            <a:picLocks noChangeAspect="1"/>
+          </p:cNvPicPr>
+          <p:nvPr/>
+        </p:nvPicPr>
+        <p:blipFill>
+          <a:blip r:embed="rId4"/>
+          <a:stretch>
+            <a:fillRect/>
+          </a:stretch>
+        </p:blipFill>
+        <p:spPr>
+          <a:xfrm>
+            <a:off x="3570809" y="3544925"/>
+            <a:ext cx="2136572" cy="889576"/>
+          </a:xfrm>
+          <a:prstGeom prst="rect">
+            <a:avLst/>
+          </a:prstGeom>
+        </p:spPr>
+      </p:pic>
     </p:spTree>
     <p:extLst>
       <p:ext uri="{BB962C8B-B14F-4D97-AF65-F5344CB8AC3E}">
@@ -12076,15 +12173,6 @@
 </file>
 
 <file path=customXml/item1.xml><?xml version="1.0" encoding="utf-8"?>
-<?mso-contentType ?>
-<FormTemplates xmlns="http://schemas.microsoft.com/sharepoint/v3/contenttype/forms">
-  <Display>DocumentLibraryForm</Display>
-  <Edit>DocumentLibraryForm</Edit>
-  <New>DocumentLibraryForm</New>
-</FormTemplates>
-</file>
-
-<file path=customXml/item2.xml><?xml version="1.0" encoding="utf-8"?>
 <ct:contentTypeSchema xmlns:ct="http://schemas.microsoft.com/office/2006/metadata/contentType" xmlns:ma="http://schemas.microsoft.com/office/2006/metadata/properties/metaAttributes" ct:_="" ma:_="" ma:contentTypeName="Document" ma:contentTypeID="0x010100E60B9E64A7B90B499F767EB2F0BD9B16" ma:contentTypeVersion="6" ma:contentTypeDescription="Een nieuw document maken." ma:contentTypeScope="" ma:versionID="b06164b3fd5da11ca9f7bb1b82024672">
   <xsd:schema xmlns:xsd="http://www.w3.org/2001/XMLSchema" xmlns:xs="http://www.w3.org/2001/XMLSchema" xmlns:p="http://schemas.microsoft.com/office/2006/metadata/properties" xmlns:ns2="bd3a200e-a112-4432-b134-79c9e3991b87" xmlns:ns3="a74c57c6-afd1-46a5-a503-29300b13d321" targetNamespace="http://schemas.microsoft.com/office/2006/metadata/properties" ma:root="true" ma:fieldsID="12483fe1a591bf0ffa72e05baf87ef3d" ns2:_="" ns3:_="">
     <xsd:import namespace="bd3a200e-a112-4432-b134-79c9e3991b87"/>
@@ -12261,6 +12349,15 @@
 </ct:contentTypeSchema>
 </file>
 
+<file path=customXml/item2.xml><?xml version="1.0" encoding="utf-8"?>
+<?mso-contentType ?>
+<FormTemplates xmlns="http://schemas.microsoft.com/sharepoint/v3/contenttype/forms">
+  <Display>DocumentLibraryForm</Display>
+  <Edit>DocumentLibraryForm</Edit>
+  <New>DocumentLibraryForm</New>
+</FormTemplates>
+</file>
+
 <file path=customXml/item3.xml><?xml version="1.0" encoding="utf-8"?>
 <p:properties xmlns:p="http://schemas.microsoft.com/office/2006/metadata/properties" xmlns:xsi="http://www.w3.org/2001/XMLSchema-instance" xmlns:pc="http://schemas.microsoft.com/office/infopath/2007/PartnerControls">
   <documentManagement/>
@@ -12268,14 +12365,6 @@
 </file>
 
 <file path=customXml/itemProps1.xml><?xml version="1.0" encoding="utf-8"?>
-<ds:datastoreItem xmlns:ds="http://schemas.openxmlformats.org/officeDocument/2006/customXml" ds:itemID="{15DF2822-16E4-4479-B239-41A079CBB65B}">
-  <ds:schemaRefs>
-    <ds:schemaRef ds:uri="http://schemas.microsoft.com/sharepoint/v3/contenttype/forms"/>
-  </ds:schemaRefs>
-</ds:datastoreItem>
-</file>
-
-<file path=customXml/itemProps2.xml><?xml version="1.0" encoding="utf-8"?>
 <ds:datastoreItem xmlns:ds="http://schemas.openxmlformats.org/officeDocument/2006/customXml" ds:itemID="{F1D9E1F8-7010-46B9-B190-C3D78E6AB5F1}">
   <ds:schemaRefs>
     <ds:schemaRef ds:uri="http://schemas.microsoft.com/office/2006/metadata/contentType"/>
@@ -12294,6 +12383,14 @@
 </ds:datastoreItem>
 </file>
 
+<file path=customXml/itemProps2.xml><?xml version="1.0" encoding="utf-8"?>
+<ds:datastoreItem xmlns:ds="http://schemas.openxmlformats.org/officeDocument/2006/customXml" ds:itemID="{15DF2822-16E4-4479-B239-41A079CBB65B}">
+  <ds:schemaRefs>
+    <ds:schemaRef ds:uri="http://schemas.microsoft.com/sharepoint/v3/contenttype/forms"/>
+  </ds:schemaRefs>
+</ds:datastoreItem>
+</file>
+
 <file path=customXml/itemProps3.xml><?xml version="1.0" encoding="utf-8"?>
 <ds:datastoreItem xmlns:ds="http://schemas.openxmlformats.org/officeDocument/2006/customXml" ds:itemID="{63653586-D9AD-4A7C-AE25-8F164514A81A}">
   <ds:schemaRefs>

</xml_diff>